<commit_message>
Last page is deleted
</commit_message>
<xml_diff>
--- a/Morrow Monitor Lunch - 20140127.pptx
+++ b/Morrow Monitor Lunch - 20140127.pptx
@@ -5,14 +5,13 @@
     <p:sldMasterId id="2147483648" r:id="rId1"/>
   </p:sldMasterIdLst>
   <p:notesMasterIdLst>
-    <p:notesMasterId r:id="rId7"/>
+    <p:notesMasterId r:id="rId6"/>
   </p:notesMasterIdLst>
   <p:sldIdLst>
     <p:sldId id="302" r:id="rId2"/>
     <p:sldId id="301" r:id="rId3"/>
     <p:sldId id="304" r:id="rId4"/>
     <p:sldId id="299" r:id="rId5"/>
-    <p:sldId id="298" r:id="rId6"/>
   </p:sldIdLst>
   <p:sldSz cx="9144000" cy="5143500" type="screen16x9"/>
   <p:notesSz cx="6950075" cy="9236075"/>
@@ -196,7 +195,7 @@
           <a:p>
             <a:fld id="{736CB1C7-4C67-4EDC-B5FF-5C73A3245CE8}" type="datetimeFigureOut">
               <a:rPr lang="en-US" smtClean="0"/>
-              <a:t>1/27/2014</a:t>
+              <a:t>1/29/2014</a:t>
             </a:fld>
             <a:endParaRPr lang="en-US"/>
           </a:p>
@@ -645,7 +644,7 @@
           <a:p>
             <a:fld id="{4D19D8EA-CF8B-4C43-8AEA-CB73A5739402}" type="datetimeFigureOut">
               <a:rPr lang="en-US" smtClean="0"/>
-              <a:t>1/27/2014</a:t>
+              <a:t>1/29/2014</a:t>
             </a:fld>
             <a:endParaRPr lang="en-US"/>
           </a:p>
@@ -815,7 +814,7 @@
           <a:p>
             <a:fld id="{4D19D8EA-CF8B-4C43-8AEA-CB73A5739402}" type="datetimeFigureOut">
               <a:rPr lang="en-US" smtClean="0"/>
-              <a:t>1/27/2014</a:t>
+              <a:t>1/29/2014</a:t>
             </a:fld>
             <a:endParaRPr lang="en-US"/>
           </a:p>
@@ -995,7 +994,7 @@
           <a:p>
             <a:fld id="{4D19D8EA-CF8B-4C43-8AEA-CB73A5739402}" type="datetimeFigureOut">
               <a:rPr lang="en-US" smtClean="0"/>
-              <a:t>1/27/2014</a:t>
+              <a:t>1/29/2014</a:t>
             </a:fld>
             <a:endParaRPr lang="en-US"/>
           </a:p>
@@ -1165,7 +1164,7 @@
           <a:p>
             <a:fld id="{4D19D8EA-CF8B-4C43-8AEA-CB73A5739402}" type="datetimeFigureOut">
               <a:rPr lang="en-US" smtClean="0"/>
-              <a:t>1/27/2014</a:t>
+              <a:t>1/29/2014</a:t>
             </a:fld>
             <a:endParaRPr lang="en-US"/>
           </a:p>
@@ -1411,7 +1410,7 @@
           <a:p>
             <a:fld id="{4D19D8EA-CF8B-4C43-8AEA-CB73A5739402}" type="datetimeFigureOut">
               <a:rPr lang="en-US" smtClean="0"/>
-              <a:t>1/27/2014</a:t>
+              <a:t>1/29/2014</a:t>
             </a:fld>
             <a:endParaRPr lang="en-US"/>
           </a:p>
@@ -1699,7 +1698,7 @@
           <a:p>
             <a:fld id="{4D19D8EA-CF8B-4C43-8AEA-CB73A5739402}" type="datetimeFigureOut">
               <a:rPr lang="en-US" smtClean="0"/>
-              <a:t>1/27/2014</a:t>
+              <a:t>1/29/2014</a:t>
             </a:fld>
             <a:endParaRPr lang="en-US"/>
           </a:p>
@@ -2126,7 +2125,7 @@
           <a:p>
             <a:fld id="{4D19D8EA-CF8B-4C43-8AEA-CB73A5739402}" type="datetimeFigureOut">
               <a:rPr lang="en-US" smtClean="0"/>
-              <a:t>1/27/2014</a:t>
+              <a:t>1/29/2014</a:t>
             </a:fld>
             <a:endParaRPr lang="en-US"/>
           </a:p>
@@ -2244,7 +2243,7 @@
           <a:p>
             <a:fld id="{4D19D8EA-CF8B-4C43-8AEA-CB73A5739402}" type="datetimeFigureOut">
               <a:rPr lang="en-US" smtClean="0"/>
-              <a:t>1/27/2014</a:t>
+              <a:t>1/29/2014</a:t>
             </a:fld>
             <a:endParaRPr lang="en-US"/>
           </a:p>
@@ -2339,7 +2338,7 @@
           <a:p>
             <a:fld id="{4D19D8EA-CF8B-4C43-8AEA-CB73A5739402}" type="datetimeFigureOut">
               <a:rPr lang="en-US" smtClean="0"/>
-              <a:t>1/27/2014</a:t>
+              <a:t>1/29/2014</a:t>
             </a:fld>
             <a:endParaRPr lang="en-US"/>
           </a:p>
@@ -2616,7 +2615,7 @@
           <a:p>
             <a:fld id="{4D19D8EA-CF8B-4C43-8AEA-CB73A5739402}" type="datetimeFigureOut">
               <a:rPr lang="en-US" smtClean="0"/>
-              <a:t>1/27/2014</a:t>
+              <a:t>1/29/2014</a:t>
             </a:fld>
             <a:endParaRPr lang="en-US"/>
           </a:p>
@@ -2869,7 +2868,7 @@
           <a:p>
             <a:fld id="{4D19D8EA-CF8B-4C43-8AEA-CB73A5739402}" type="datetimeFigureOut">
               <a:rPr lang="en-US" smtClean="0"/>
-              <a:t>1/27/2014</a:t>
+              <a:t>1/29/2014</a:t>
             </a:fld>
             <a:endParaRPr lang="en-US"/>
           </a:p>
@@ -3082,7 +3081,7 @@
           <a:p>
             <a:fld id="{4D19D8EA-CF8B-4C43-8AEA-CB73A5739402}" type="datetimeFigureOut">
               <a:rPr lang="en-US" smtClean="0"/>
-              <a:t>1/27/2014</a:t>
+              <a:t>1/29/2014</a:t>
             </a:fld>
             <a:endParaRPr lang="en-US"/>
           </a:p>
@@ -16941,133 +16940,6 @@
     <p:extLst>
       <p:ext uri="{BB962C8B-B14F-4D97-AF65-F5344CB8AC3E}">
         <p14:creationId xmlns:p14="http://schemas.microsoft.com/office/powerpoint/2010/main" val="2642585046"/>
-      </p:ext>
-    </p:extLst>
-  </p:cSld>
-  <p:clrMapOvr>
-    <a:masterClrMapping/>
-  </p:clrMapOvr>
-  <p:timing>
-    <p:tnLst>
-      <p:par>
-        <p:cTn id="1" dur="indefinite" restart="never" nodeType="tmRoot"/>
-      </p:par>
-    </p:tnLst>
-  </p:timing>
-</p:sld>
-</file>
-
-<file path=ppt/slides/slide5.xml><?xml version="1.0" encoding="utf-8"?>
-<p:sld xmlns:a="http://schemas.openxmlformats.org/drawingml/2006/main" xmlns:r="http://schemas.openxmlformats.org/officeDocument/2006/relationships" xmlns:p="http://schemas.openxmlformats.org/presentationml/2006/main">
-  <p:cSld>
-    <p:spTree>
-      <p:nvGrpSpPr>
-        <p:cNvPr id="1" name=""/>
-        <p:cNvGrpSpPr/>
-        <p:nvPr/>
-      </p:nvGrpSpPr>
-      <p:grpSpPr>
-        <a:xfrm>
-          <a:off x="0" y="0"/>
-          <a:ext cx="0" cy="0"/>
-          <a:chOff x="0" y="0"/>
-          <a:chExt cx="0" cy="0"/>
-        </a:xfrm>
-      </p:grpSpPr>
-      <p:pic>
-        <p:nvPicPr>
-          <p:cNvPr id="4" name="Picture 3"/>
-          <p:cNvPicPr>
-            <a:picLocks noChangeAspect="1"/>
-          </p:cNvPicPr>
-          <p:nvPr/>
-        </p:nvPicPr>
-        <p:blipFill>
-          <a:blip r:embed="rId2" cstate="print">
-            <a:extLst>
-              <a:ext uri="{28A0092B-C50C-407E-A947-70E740481C1C}">
-                <a14:useLocalDpi xmlns:a14="http://schemas.microsoft.com/office/drawing/2010/main" val="0"/>
-              </a:ext>
-            </a:extLst>
-          </a:blip>
-          <a:stretch>
-            <a:fillRect/>
-          </a:stretch>
-        </p:blipFill>
-        <p:spPr>
-          <a:xfrm flipH="1">
-            <a:off x="-10971" y="0"/>
-            <a:ext cx="9229976" cy="5928630"/>
-          </a:xfrm>
-          <a:prstGeom prst="rect">
-            <a:avLst/>
-          </a:prstGeom>
-        </p:spPr>
-      </p:pic>
-      <p:pic>
-        <p:nvPicPr>
-          <p:cNvPr id="5" name="Picture 4"/>
-          <p:cNvPicPr>
-            <a:picLocks noChangeAspect="1"/>
-          </p:cNvPicPr>
-          <p:nvPr/>
-        </p:nvPicPr>
-        <p:blipFill>
-          <a:blip r:embed="rId3" cstate="print">
-            <a:extLst>
-              <a:ext uri="{28A0092B-C50C-407E-A947-70E740481C1C}">
-                <a14:useLocalDpi xmlns:a14="http://schemas.microsoft.com/office/drawing/2010/main" val="0"/>
-              </a:ext>
-            </a:extLst>
-          </a:blip>
-          <a:stretch>
-            <a:fillRect/>
-          </a:stretch>
-        </p:blipFill>
-        <p:spPr>
-          <a:xfrm>
-            <a:off x="193830" y="2226105"/>
-            <a:ext cx="2781618" cy="2619250"/>
-          </a:xfrm>
-          <a:prstGeom prst="rect">
-            <a:avLst/>
-          </a:prstGeom>
-        </p:spPr>
-      </p:pic>
-      <p:pic>
-        <p:nvPicPr>
-          <p:cNvPr id="6" name="Picture 5"/>
-          <p:cNvPicPr>
-            <a:picLocks noChangeAspect="1"/>
-          </p:cNvPicPr>
-          <p:nvPr/>
-        </p:nvPicPr>
-        <p:blipFill>
-          <a:blip r:embed="rId4" cstate="print">
-            <a:extLst>
-              <a:ext uri="{28A0092B-C50C-407E-A947-70E740481C1C}">
-                <a14:useLocalDpi xmlns:a14="http://schemas.microsoft.com/office/drawing/2010/main" val="0"/>
-              </a:ext>
-            </a:extLst>
-          </a:blip>
-          <a:stretch>
-            <a:fillRect/>
-          </a:stretch>
-        </p:blipFill>
-        <p:spPr>
-          <a:xfrm>
-            <a:off x="1845245" y="421070"/>
-            <a:ext cx="3149210" cy="1538382"/>
-          </a:xfrm>
-          <a:prstGeom prst="rect">
-            <a:avLst/>
-          </a:prstGeom>
-        </p:spPr>
-      </p:pic>
-    </p:spTree>
-    <p:extLst>
-      <p:ext uri="{BB962C8B-B14F-4D97-AF65-F5344CB8AC3E}">
-        <p14:creationId xmlns:p14="http://schemas.microsoft.com/office/powerpoint/2010/main" val="2358906116"/>
       </p:ext>
     </p:extLst>
   </p:cSld>

</xml_diff>